<commit_message>
New pdf + index for data lead
</commit_message>
<xml_diff>
--- a/assets/img/team/Who-Does-What_Sept EAP [Autosaved].pptx
+++ b/assets/img/team/Who-Does-What_Sept EAP [Autosaved].pptx
@@ -247,7 +247,7 @@
             <a:fld id="{3CB3D48B-767D-40D5-B840-5027EB30A9C2}" type="datetimeFigureOut">
               <a:rPr lang="en-US" smtClean="0"/>
               <a:pPr/>
-              <a:t>10/23/20</a:t>
+              <a:t>10/26/20</a:t>
             </a:fld>
             <a:endParaRPr lang="en-US"/>
           </a:p>
@@ -5353,7 +5353,7 @@
           <a:p>
             <a:fld id="{756377DB-6421-466D-A038-B156AE725FFA}" type="datetime4">
               <a:rPr lang="en-US" smtClean="0"/>
-              <a:t>October 23, 2020</a:t>
+              <a:t>October 26, 2020</a:t>
             </a:fld>
             <a:endParaRPr lang="en-US"/>
           </a:p>
@@ -6439,7 +6439,7 @@
           <a:p>
             <a:fld id="{DAC663EF-3062-4105-BF18-A098977330DD}" type="datetime4">
               <a:rPr lang="en-US" smtClean="0"/>
-              <a:t>October 23, 2020</a:t>
+              <a:t>October 26, 2020</a:t>
             </a:fld>
             <a:endParaRPr lang="en-US"/>
           </a:p>
@@ -7227,7 +7227,7 @@
           <a:p>
             <a:fld id="{B8391083-D2DD-4D07-89E3-0A25A858EE26}" type="datetime4">
               <a:rPr lang="en-US" smtClean="0"/>
-              <a:t>October 23, 2020</a:t>
+              <a:t>October 26, 2020</a:t>
             </a:fld>
             <a:endParaRPr lang="en-US"/>
           </a:p>
@@ -9446,7 +9446,7 @@
           <a:p>
             <a:fld id="{9A83FFFF-B3AE-4C00-8DE6-FCD71DDF6556}" type="datetime4">
               <a:rPr lang="en-US" smtClean="0"/>
-              <a:t>October 23, 2020</a:t>
+              <a:t>October 26, 2020</a:t>
             </a:fld>
             <a:endParaRPr lang="en-US"/>
           </a:p>
@@ -14112,7 +14112,7 @@
           <a:p>
             <a:fld id="{FD7709B8-7745-5F4E-8021-EFB3095139C1}" type="datetimeFigureOut">
               <a:rPr lang="en-US" smtClean="0"/>
-              <a:t>10/23/20</a:t>
+              <a:t>10/26/20</a:t>
             </a:fld>
             <a:endParaRPr lang="en-US"/>
           </a:p>
@@ -20477,7 +20477,7 @@
                   <a:ea typeface="Century Gothic" charset="0"/>
                   <a:cs typeface="Century Gothic" charset="0"/>
                 </a:rPr>
-                <a:t>Wealth, ANS, Human Dimensions of Poverty</a:t>
+                <a:t>Wealth, ANS, Hidden Dimensions of Poverty</a:t>
               </a:r>
             </a:p>
           </p:txBody>
@@ -21119,7 +21119,7 @@
                   <a:ea typeface="Century Gothic" charset="0"/>
                   <a:cs typeface="Century Gothic" charset="0"/>
                 </a:rPr>
-                <a:t>&amp; TECH LAB</a:t>
+                <a:t>&amp; TECH </a:t>
               </a:r>
             </a:p>
           </p:txBody>
@@ -21268,191 +21268,6 @@
           </a:p>
         </p:txBody>
       </p:sp>
-      <p:sp>
-        <p:nvSpPr>
-          <p:cNvPr id="146" name="Hexagon 145"/>
-          <p:cNvSpPr>
-            <a:spLocks noChangeAspect="1"/>
-          </p:cNvSpPr>
-          <p:nvPr/>
-        </p:nvSpPr>
-        <p:spPr>
-          <a:xfrm>
-            <a:off x="7468619" y="6769625"/>
-            <a:ext cx="1347614" cy="1150538"/>
-          </a:xfrm>
-          <a:prstGeom prst="hexagon">
-            <a:avLst/>
-          </a:prstGeom>
-          <a:solidFill>
-            <a:schemeClr val="accent6">
-              <a:lumMod val="20000"/>
-              <a:lumOff val="80000"/>
-            </a:schemeClr>
-          </a:solidFill>
-          <a:ln w="38100">
-            <a:solidFill>
-              <a:schemeClr val="accent6">
-                <a:lumMod val="60000"/>
-                <a:lumOff val="40000"/>
-              </a:schemeClr>
-            </a:solidFill>
-          </a:ln>
-        </p:spPr>
-        <p:style>
-          <a:lnRef idx="2">
-            <a:schemeClr val="accent1">
-              <a:shade val="50000"/>
-            </a:schemeClr>
-          </a:lnRef>
-          <a:fillRef idx="1">
-            <a:schemeClr val="accent1"/>
-          </a:fillRef>
-          <a:effectRef idx="0">
-            <a:schemeClr val="accent1"/>
-          </a:effectRef>
-          <a:fontRef idx="minor">
-            <a:schemeClr val="lt1"/>
-          </a:fontRef>
-        </p:style>
-        <p:txBody>
-          <a:bodyPr rtlCol="0" anchor="ctr"/>
-          <a:lstStyle/>
-          <a:p>
-            <a:pPr algn="ctr"/>
-            <a:endParaRPr lang="en-US" sz="2454"/>
-          </a:p>
-        </p:txBody>
-      </p:sp>
-      <p:grpSp>
-        <p:nvGrpSpPr>
-          <p:cNvPr id="147" name="Group 146"/>
-          <p:cNvGrpSpPr/>
-          <p:nvPr/>
-        </p:nvGrpSpPr>
-        <p:grpSpPr>
-          <a:xfrm>
-            <a:off x="7571274" y="6923541"/>
-            <a:ext cx="1142303" cy="945920"/>
-            <a:chOff x="3691611" y="2354747"/>
-            <a:chExt cx="1675378" cy="1387349"/>
-          </a:xfrm>
-        </p:grpSpPr>
-        <p:sp>
-          <p:nvSpPr>
-            <p:cNvPr id="148" name="TextBox 147"/>
-            <p:cNvSpPr txBox="1"/>
-            <p:nvPr/>
-          </p:nvSpPr>
-          <p:spPr>
-            <a:xfrm>
-              <a:off x="3691611" y="2354747"/>
-              <a:ext cx="1675378" cy="381625"/>
-            </a:xfrm>
-            <a:prstGeom prst="rect">
-              <a:avLst/>
-            </a:prstGeom>
-            <a:noFill/>
-          </p:spPr>
-          <p:txBody>
-            <a:bodyPr wrap="square" rtlCol="0">
-              <a:spAutoFit/>
-            </a:bodyPr>
-            <a:lstStyle/>
-            <a:p>
-              <a:pPr algn="ctr"/>
-              <a:r>
-                <a:rPr lang="en-US" sz="1091" dirty="0">
-                  <a:latin typeface="Century Gothic" charset="0"/>
-                  <a:ea typeface="Century Gothic" charset="0"/>
-                  <a:cs typeface="Century Gothic" charset="0"/>
-                </a:rPr>
-                <a:t>FCV</a:t>
-              </a:r>
-            </a:p>
-          </p:txBody>
-        </p:sp>
-        <p:cxnSp>
-          <p:nvCxnSpPr>
-            <p:cNvPr id="149" name="Straight Connector 148"/>
-            <p:cNvCxnSpPr/>
-            <p:nvPr/>
-          </p:nvCxnSpPr>
-          <p:spPr>
-            <a:xfrm>
-              <a:off x="3974453" y="2774699"/>
-              <a:ext cx="1112344" cy="0"/>
-            </a:xfrm>
-            <a:prstGeom prst="line">
-              <a:avLst/>
-            </a:prstGeom>
-          </p:spPr>
-          <p:style>
-            <a:lnRef idx="1">
-              <a:schemeClr val="accent1"/>
-            </a:lnRef>
-            <a:fillRef idx="0">
-              <a:schemeClr val="accent1"/>
-            </a:fillRef>
-            <a:effectRef idx="0">
-              <a:schemeClr val="accent1"/>
-            </a:effectRef>
-            <a:fontRef idx="minor">
-              <a:schemeClr val="tx1"/>
-            </a:fontRef>
-          </p:style>
-        </p:cxnSp>
-        <p:sp>
-          <p:nvSpPr>
-            <p:cNvPr id="150" name="TextBox 149"/>
-            <p:cNvSpPr txBox="1"/>
-            <p:nvPr/>
-          </p:nvSpPr>
-          <p:spPr>
-            <a:xfrm>
-              <a:off x="3797726" y="2868250"/>
-              <a:ext cx="1463148" cy="873846"/>
-            </a:xfrm>
-            <a:prstGeom prst="rect">
-              <a:avLst/>
-            </a:prstGeom>
-            <a:noFill/>
-          </p:spPr>
-          <p:txBody>
-            <a:bodyPr wrap="square" rtlCol="0">
-              <a:spAutoFit/>
-            </a:bodyPr>
-            <a:lstStyle/>
-            <a:p>
-              <a:pPr algn="ctr"/>
-              <a:r>
-                <a:rPr lang="en-US" sz="818" dirty="0">
-                  <a:latin typeface="Century Gothic" charset="0"/>
-                  <a:ea typeface="Century Gothic" charset="0"/>
-                  <a:cs typeface="Century Gothic" charset="0"/>
-                </a:rPr>
-                <a:t>GEMS </a:t>
-              </a:r>
-              <a:r>
-                <a:rPr lang="mr-IN" sz="818" dirty="0">
-                  <a:latin typeface="Century Gothic" charset="0"/>
-                  <a:ea typeface="Century Gothic" charset="0"/>
-                  <a:cs typeface="Century Gothic" charset="0"/>
-                </a:rPr>
-                <a:t>–</a:t>
-              </a:r>
-              <a:r>
-                <a:rPr lang="en-US" sz="818" dirty="0">
-                  <a:latin typeface="Century Gothic" charset="0"/>
-                  <a:ea typeface="Century Gothic" charset="0"/>
-                  <a:cs typeface="Century Gothic" charset="0"/>
-                </a:rPr>
-                <a:t> geospatial data collection training</a:t>
-              </a:r>
-            </a:p>
-          </p:txBody>
-        </p:sp>
-      </p:grpSp>
       <p:sp>
         <p:nvSpPr>
           <p:cNvPr id="168" name="TextBox 167"/>
@@ -31293,7 +31108,7 @@
         </p:nvSpPr>
         <p:spPr>
           <a:xfrm>
-            <a:off x="12269213" y="9947995"/>
+            <a:off x="12261029" y="9875276"/>
             <a:ext cx="1347614" cy="1150538"/>
           </a:xfrm>
           <a:prstGeom prst="hexagon">
@@ -31679,221 +31494,6 @@
           </a:p>
         </p:txBody>
       </p:sp>
-      <p:sp>
-        <p:nvSpPr>
-          <p:cNvPr id="566" name="Hexagon 565">
-            <a:extLst>
-              <a:ext uri="{FF2B5EF4-FFF2-40B4-BE49-F238E27FC236}">
-                <a16:creationId xmlns:a16="http://schemas.microsoft.com/office/drawing/2014/main" id="{C2BF86BF-B067-9D46-8DB5-54342263CD08}"/>
-              </a:ext>
-            </a:extLst>
-          </p:cNvPr>
-          <p:cNvSpPr>
-            <a:spLocks noChangeAspect="1"/>
-          </p:cNvSpPr>
-          <p:nvPr/>
-        </p:nvSpPr>
-        <p:spPr>
-          <a:xfrm>
-            <a:off x="13414903" y="11842485"/>
-            <a:ext cx="1347614" cy="1150538"/>
-          </a:xfrm>
-          <a:prstGeom prst="hexagon">
-            <a:avLst/>
-          </a:prstGeom>
-          <a:solidFill>
-            <a:schemeClr val="accent6">
-              <a:lumMod val="20000"/>
-              <a:lumOff val="80000"/>
-            </a:schemeClr>
-          </a:solidFill>
-          <a:ln w="38100">
-            <a:solidFill>
-              <a:schemeClr val="accent6">
-                <a:lumMod val="60000"/>
-                <a:lumOff val="40000"/>
-              </a:schemeClr>
-            </a:solidFill>
-          </a:ln>
-        </p:spPr>
-        <p:style>
-          <a:lnRef idx="2">
-            <a:schemeClr val="accent1">
-              <a:shade val="50000"/>
-            </a:schemeClr>
-          </a:lnRef>
-          <a:fillRef idx="1">
-            <a:schemeClr val="accent1"/>
-          </a:fillRef>
-          <a:effectRef idx="0">
-            <a:schemeClr val="accent1"/>
-          </a:effectRef>
-          <a:fontRef idx="minor">
-            <a:schemeClr val="lt1"/>
-          </a:fontRef>
-        </p:style>
-        <p:txBody>
-          <a:bodyPr rtlCol="0" anchor="ctr"/>
-          <a:lstStyle/>
-          <a:p>
-            <a:pPr algn="ctr"/>
-            <a:endParaRPr lang="en-US" sz="2454"/>
-          </a:p>
-        </p:txBody>
-      </p:sp>
-      <p:grpSp>
-        <p:nvGrpSpPr>
-          <p:cNvPr id="562" name="Group 561">
-            <a:extLst>
-              <a:ext uri="{FF2B5EF4-FFF2-40B4-BE49-F238E27FC236}">
-                <a16:creationId xmlns:a16="http://schemas.microsoft.com/office/drawing/2014/main" id="{542F4965-A268-6F43-8FB3-FA0118BC1F65}"/>
-              </a:ext>
-            </a:extLst>
-          </p:cNvPr>
-          <p:cNvGrpSpPr/>
-          <p:nvPr/>
-        </p:nvGrpSpPr>
-        <p:grpSpPr>
-          <a:xfrm>
-            <a:off x="13519051" y="11938024"/>
-            <a:ext cx="1198643" cy="694185"/>
-            <a:chOff x="3691611" y="2354747"/>
-            <a:chExt cx="1758010" cy="1018137"/>
-          </a:xfrm>
-        </p:grpSpPr>
-        <p:sp>
-          <p:nvSpPr>
-            <p:cNvPr id="563" name="TextBox 562">
-              <a:extLst>
-                <a:ext uri="{FF2B5EF4-FFF2-40B4-BE49-F238E27FC236}">
-                  <a16:creationId xmlns:a16="http://schemas.microsoft.com/office/drawing/2014/main" id="{11AB586C-E7B4-0340-9396-7B7BBB1BDAA1}"/>
-                </a:ext>
-              </a:extLst>
-            </p:cNvPr>
-            <p:cNvSpPr txBox="1"/>
-            <p:nvPr/>
-          </p:nvSpPr>
-          <p:spPr>
-            <a:xfrm>
-              <a:off x="3691611" y="2354747"/>
-              <a:ext cx="1675378" cy="381625"/>
-            </a:xfrm>
-            <a:prstGeom prst="rect">
-              <a:avLst/>
-            </a:prstGeom>
-            <a:noFill/>
-          </p:spPr>
-          <p:txBody>
-            <a:bodyPr wrap="square" rtlCol="0">
-              <a:spAutoFit/>
-            </a:bodyPr>
-            <a:lstStyle/>
-            <a:p>
-              <a:pPr algn="ctr"/>
-              <a:r>
-                <a:rPr lang="en-US" sz="1091" dirty="0">
-                  <a:latin typeface="Century Gothic" charset="0"/>
-                  <a:ea typeface="Century Gothic" charset="0"/>
-                  <a:cs typeface="Century Gothic" charset="0"/>
-                </a:rPr>
-                <a:t>FCV</a:t>
-              </a:r>
-            </a:p>
-          </p:txBody>
-        </p:sp>
-        <p:cxnSp>
-          <p:nvCxnSpPr>
-            <p:cNvPr id="564" name="Straight Connector 563">
-              <a:extLst>
-                <a:ext uri="{FF2B5EF4-FFF2-40B4-BE49-F238E27FC236}">
-                  <a16:creationId xmlns:a16="http://schemas.microsoft.com/office/drawing/2014/main" id="{F6973424-7929-A844-969E-5525338EE05C}"/>
-                </a:ext>
-              </a:extLst>
-            </p:cNvPr>
-            <p:cNvCxnSpPr/>
-            <p:nvPr/>
-          </p:nvCxnSpPr>
-          <p:spPr>
-            <a:xfrm>
-              <a:off x="3974453" y="2774699"/>
-              <a:ext cx="1112344" cy="0"/>
-            </a:xfrm>
-            <a:prstGeom prst="line">
-              <a:avLst/>
-            </a:prstGeom>
-          </p:spPr>
-          <p:style>
-            <a:lnRef idx="1">
-              <a:schemeClr val="accent1"/>
-            </a:lnRef>
-            <a:fillRef idx="0">
-              <a:schemeClr val="accent1"/>
-            </a:fillRef>
-            <a:effectRef idx="0">
-              <a:schemeClr val="accent1"/>
-            </a:effectRef>
-            <a:fontRef idx="minor">
-              <a:schemeClr val="tx1"/>
-            </a:fontRef>
-          </p:style>
-        </p:cxnSp>
-        <p:sp>
-          <p:nvSpPr>
-            <p:cNvPr id="565" name="TextBox 564">
-              <a:extLst>
-                <a:ext uri="{FF2B5EF4-FFF2-40B4-BE49-F238E27FC236}">
-                  <a16:creationId xmlns:a16="http://schemas.microsoft.com/office/drawing/2014/main" id="{7840C0E1-6134-6E4E-A66B-9E01DCD8EE36}"/>
-                </a:ext>
-              </a:extLst>
-            </p:cNvPr>
-            <p:cNvSpPr txBox="1"/>
-            <p:nvPr/>
-          </p:nvSpPr>
-          <p:spPr>
-            <a:xfrm>
-              <a:off x="3797726" y="2868250"/>
-              <a:ext cx="1651895" cy="504634"/>
-            </a:xfrm>
-            <a:prstGeom prst="rect">
-              <a:avLst/>
-            </a:prstGeom>
-            <a:noFill/>
-          </p:spPr>
-          <p:txBody>
-            <a:bodyPr wrap="square" rtlCol="0">
-              <a:spAutoFit/>
-            </a:bodyPr>
-            <a:lstStyle/>
-            <a:p>
-              <a:pPr algn="ctr"/>
-              <a:r>
-                <a:rPr lang="en-US" sz="818" dirty="0">
-                  <a:latin typeface="Century Gothic" charset="0"/>
-                  <a:ea typeface="Century Gothic" charset="0"/>
-                  <a:cs typeface="Century Gothic" charset="0"/>
-                </a:rPr>
-                <a:t>GEMS </a:t>
-              </a:r>
-              <a:r>
-                <a:rPr lang="mr-IN" sz="818" dirty="0">
-                  <a:latin typeface="Century Gothic" charset="0"/>
-                  <a:ea typeface="Century Gothic" charset="0"/>
-                  <a:cs typeface="Century Gothic" charset="0"/>
-                </a:rPr>
-                <a:t>–</a:t>
-              </a:r>
-              <a:r>
-                <a:rPr lang="en-US" sz="818" dirty="0">
-                  <a:latin typeface="Century Gothic" charset="0"/>
-                  <a:ea typeface="Century Gothic" charset="0"/>
-                  <a:cs typeface="Century Gothic" charset="0"/>
-                </a:rPr>
-                <a:t> capacity building </a:t>
-              </a:r>
-            </a:p>
-          </p:txBody>
-        </p:sp>
-      </p:grpSp>
       <p:grpSp>
         <p:nvGrpSpPr>
           <p:cNvPr id="567" name="Group 566">
@@ -32042,6 +31642,579 @@
           </p:txBody>
         </p:sp>
       </p:grpSp>
+      <p:sp>
+        <p:nvSpPr>
+          <p:cNvPr id="408" name="Hexagon 407">
+            <a:extLst>
+              <a:ext uri="{FF2B5EF4-FFF2-40B4-BE49-F238E27FC236}">
+                <a16:creationId xmlns:a16="http://schemas.microsoft.com/office/drawing/2014/main" id="{3C8A9E78-0E8C-3546-8621-3D7A1F9CEBB8}"/>
+              </a:ext>
+            </a:extLst>
+          </p:cNvPr>
+          <p:cNvSpPr>
+            <a:spLocks noChangeAspect="1"/>
+          </p:cNvSpPr>
+          <p:nvPr/>
+        </p:nvSpPr>
+        <p:spPr>
+          <a:xfrm>
+            <a:off x="20758181" y="1074116"/>
+            <a:ext cx="1347614" cy="1150538"/>
+          </a:xfrm>
+          <a:prstGeom prst="hexagon">
+            <a:avLst/>
+          </a:prstGeom>
+          <a:solidFill>
+            <a:schemeClr val="accent3">
+              <a:lumMod val="60000"/>
+              <a:lumOff val="40000"/>
+            </a:schemeClr>
+          </a:solidFill>
+          <a:ln w="38100">
+            <a:solidFill>
+              <a:schemeClr val="accent3"/>
+            </a:solidFill>
+          </a:ln>
+        </p:spPr>
+        <p:style>
+          <a:lnRef idx="2">
+            <a:schemeClr val="accent1">
+              <a:shade val="50000"/>
+            </a:schemeClr>
+          </a:lnRef>
+          <a:fillRef idx="1">
+            <a:schemeClr val="accent1"/>
+          </a:fillRef>
+          <a:effectRef idx="0">
+            <a:schemeClr val="accent1"/>
+          </a:effectRef>
+          <a:fontRef idx="minor">
+            <a:schemeClr val="lt1"/>
+          </a:fontRef>
+        </p:style>
+        <p:txBody>
+          <a:bodyPr rtlCol="0" anchor="ctr"/>
+          <a:lstStyle/>
+          <a:p>
+            <a:pPr algn="ctr"/>
+            <a:endParaRPr lang="en-US" sz="2454"/>
+          </a:p>
+        </p:txBody>
+      </p:sp>
+      <p:sp>
+        <p:nvSpPr>
+          <p:cNvPr id="409" name="TextBox 408">
+            <a:extLst>
+              <a:ext uri="{FF2B5EF4-FFF2-40B4-BE49-F238E27FC236}">
+                <a16:creationId xmlns:a16="http://schemas.microsoft.com/office/drawing/2014/main" id="{C2A88A78-B3C7-4746-A235-5EBFEFA8C393}"/>
+              </a:ext>
+            </a:extLst>
+          </p:cNvPr>
+          <p:cNvSpPr txBox="1"/>
+          <p:nvPr/>
+        </p:nvSpPr>
+        <p:spPr>
+          <a:xfrm>
+            <a:off x="20791913" y="1285759"/>
+            <a:ext cx="1142303" cy="260199"/>
+          </a:xfrm>
+          <a:prstGeom prst="rect">
+            <a:avLst/>
+          </a:prstGeom>
+          <a:noFill/>
+        </p:spPr>
+        <p:txBody>
+          <a:bodyPr wrap="square" rtlCol="0">
+            <a:spAutoFit/>
+          </a:bodyPr>
+          <a:lstStyle/>
+          <a:p>
+            <a:pPr algn="ctr"/>
+            <a:r>
+              <a:rPr lang="en-US" sz="1091" dirty="0">
+                <a:latin typeface="Century Gothic" charset="0"/>
+                <a:ea typeface="Century Gothic" charset="0"/>
+                <a:cs typeface="Century Gothic" charset="0"/>
+              </a:rPr>
+              <a:t>GEMS</a:t>
+            </a:r>
+          </a:p>
+        </p:txBody>
+      </p:sp>
+      <p:cxnSp>
+        <p:nvCxnSpPr>
+          <p:cNvPr id="411" name="Straight Connector 410">
+            <a:extLst>
+              <a:ext uri="{FF2B5EF4-FFF2-40B4-BE49-F238E27FC236}">
+                <a16:creationId xmlns:a16="http://schemas.microsoft.com/office/drawing/2014/main" id="{DF0DF277-43C9-E04A-A5FA-8AC343E88DD4}"/>
+              </a:ext>
+            </a:extLst>
+          </p:cNvPr>
+          <p:cNvCxnSpPr/>
+          <p:nvPr/>
+        </p:nvCxnSpPr>
+        <p:spPr>
+          <a:xfrm>
+            <a:off x="21051042" y="1580401"/>
+            <a:ext cx="758417" cy="0"/>
+          </a:xfrm>
+          <a:prstGeom prst="line">
+            <a:avLst/>
+          </a:prstGeom>
+        </p:spPr>
+        <p:style>
+          <a:lnRef idx="1">
+            <a:schemeClr val="accent1"/>
+          </a:lnRef>
+          <a:fillRef idx="0">
+            <a:schemeClr val="accent1"/>
+          </a:fillRef>
+          <a:effectRef idx="0">
+            <a:schemeClr val="accent1"/>
+          </a:effectRef>
+          <a:fontRef idx="minor">
+            <a:schemeClr val="tx1"/>
+          </a:fontRef>
+        </p:style>
+      </p:cxnSp>
+      <p:sp>
+        <p:nvSpPr>
+          <p:cNvPr id="415" name="TextBox 414">
+            <a:extLst>
+              <a:ext uri="{FF2B5EF4-FFF2-40B4-BE49-F238E27FC236}">
+                <a16:creationId xmlns:a16="http://schemas.microsoft.com/office/drawing/2014/main" id="{190CB4C8-A18D-CF4D-BDC5-9FE9102DDB02}"/>
+              </a:ext>
+            </a:extLst>
+          </p:cNvPr>
+          <p:cNvSpPr txBox="1"/>
+          <p:nvPr/>
+        </p:nvSpPr>
+        <p:spPr>
+          <a:xfrm>
+            <a:off x="20884817" y="1638354"/>
+            <a:ext cx="1133673" cy="344069"/>
+          </a:xfrm>
+          <a:prstGeom prst="rect">
+            <a:avLst/>
+          </a:prstGeom>
+          <a:noFill/>
+        </p:spPr>
+        <p:txBody>
+          <a:bodyPr wrap="square" rtlCol="0">
+            <a:spAutoFit/>
+          </a:bodyPr>
+          <a:lstStyle/>
+          <a:p>
+            <a:pPr algn="ctr"/>
+            <a:r>
+              <a:rPr lang="en-US" sz="818" dirty="0">
+                <a:latin typeface="Century Gothic" charset="0"/>
+                <a:ea typeface="Century Gothic" charset="0"/>
+                <a:cs typeface="Century Gothic" charset="0"/>
+              </a:rPr>
+              <a:t>FCV </a:t>
+            </a:r>
+            <a:r>
+              <a:rPr lang="mr-IN" sz="818" dirty="0">
+                <a:latin typeface="Century Gothic" charset="0"/>
+                <a:ea typeface="Century Gothic" charset="0"/>
+                <a:cs typeface="Century Gothic" charset="0"/>
+              </a:rPr>
+              <a:t>–</a:t>
+            </a:r>
+            <a:r>
+              <a:rPr lang="en-US" sz="818" dirty="0">
+                <a:latin typeface="Century Gothic" charset="0"/>
+                <a:ea typeface="Century Gothic" charset="0"/>
+                <a:cs typeface="Century Gothic" charset="0"/>
+              </a:rPr>
+              <a:t> geospatial data analysis</a:t>
+            </a:r>
+          </a:p>
+        </p:txBody>
+      </p:sp>
+      <p:sp>
+        <p:nvSpPr>
+          <p:cNvPr id="434" name="Hexagon 433">
+            <a:extLst>
+              <a:ext uri="{FF2B5EF4-FFF2-40B4-BE49-F238E27FC236}">
+                <a16:creationId xmlns:a16="http://schemas.microsoft.com/office/drawing/2014/main" id="{D8F8DC93-826A-4B43-BE7D-E9276937FE63}"/>
+              </a:ext>
+            </a:extLst>
+          </p:cNvPr>
+          <p:cNvSpPr>
+            <a:spLocks noChangeAspect="1"/>
+          </p:cNvSpPr>
+          <p:nvPr/>
+        </p:nvSpPr>
+        <p:spPr>
+          <a:xfrm>
+            <a:off x="13407192" y="11865513"/>
+            <a:ext cx="1347614" cy="1150538"/>
+          </a:xfrm>
+          <a:prstGeom prst="hexagon">
+            <a:avLst/>
+          </a:prstGeom>
+          <a:solidFill>
+            <a:schemeClr val="accent3">
+              <a:lumMod val="60000"/>
+              <a:lumOff val="40000"/>
+            </a:schemeClr>
+          </a:solidFill>
+          <a:ln w="38100">
+            <a:solidFill>
+              <a:schemeClr val="accent3"/>
+            </a:solidFill>
+          </a:ln>
+        </p:spPr>
+        <p:style>
+          <a:lnRef idx="2">
+            <a:schemeClr val="accent1">
+              <a:shade val="50000"/>
+            </a:schemeClr>
+          </a:lnRef>
+          <a:fillRef idx="1">
+            <a:schemeClr val="accent1"/>
+          </a:fillRef>
+          <a:effectRef idx="0">
+            <a:schemeClr val="accent1"/>
+          </a:effectRef>
+          <a:fontRef idx="minor">
+            <a:schemeClr val="lt1"/>
+          </a:fontRef>
+        </p:style>
+        <p:txBody>
+          <a:bodyPr rtlCol="0" anchor="ctr"/>
+          <a:lstStyle/>
+          <a:p>
+            <a:pPr algn="ctr"/>
+            <a:endParaRPr lang="en-US" sz="2454"/>
+          </a:p>
+        </p:txBody>
+      </p:sp>
+      <p:sp>
+        <p:nvSpPr>
+          <p:cNvPr id="443" name="TextBox 442">
+            <a:extLst>
+              <a:ext uri="{FF2B5EF4-FFF2-40B4-BE49-F238E27FC236}">
+                <a16:creationId xmlns:a16="http://schemas.microsoft.com/office/drawing/2014/main" id="{A33989C4-4A77-4944-BD6C-1974F3332284}"/>
+              </a:ext>
+            </a:extLst>
+          </p:cNvPr>
+          <p:cNvSpPr txBox="1"/>
+          <p:nvPr/>
+        </p:nvSpPr>
+        <p:spPr>
+          <a:xfrm>
+            <a:off x="13440924" y="12077156"/>
+            <a:ext cx="1142303" cy="260199"/>
+          </a:xfrm>
+          <a:prstGeom prst="rect">
+            <a:avLst/>
+          </a:prstGeom>
+          <a:noFill/>
+        </p:spPr>
+        <p:txBody>
+          <a:bodyPr wrap="square" rtlCol="0">
+            <a:spAutoFit/>
+          </a:bodyPr>
+          <a:lstStyle/>
+          <a:p>
+            <a:pPr algn="ctr"/>
+            <a:r>
+              <a:rPr lang="en-US" sz="1091" dirty="0">
+                <a:latin typeface="Century Gothic" charset="0"/>
+                <a:ea typeface="Century Gothic" charset="0"/>
+                <a:cs typeface="Century Gothic" charset="0"/>
+              </a:rPr>
+              <a:t>GEMS</a:t>
+            </a:r>
+          </a:p>
+        </p:txBody>
+      </p:sp>
+      <p:cxnSp>
+        <p:nvCxnSpPr>
+          <p:cNvPr id="456" name="Straight Connector 455">
+            <a:extLst>
+              <a:ext uri="{FF2B5EF4-FFF2-40B4-BE49-F238E27FC236}">
+                <a16:creationId xmlns:a16="http://schemas.microsoft.com/office/drawing/2014/main" id="{43E8E2D1-0D7B-B649-A2DC-F8C18264BC62}"/>
+              </a:ext>
+            </a:extLst>
+          </p:cNvPr>
+          <p:cNvCxnSpPr/>
+          <p:nvPr/>
+        </p:nvCxnSpPr>
+        <p:spPr>
+          <a:xfrm>
+            <a:off x="13700053" y="12371798"/>
+            <a:ext cx="758417" cy="0"/>
+          </a:xfrm>
+          <a:prstGeom prst="line">
+            <a:avLst/>
+          </a:prstGeom>
+        </p:spPr>
+        <p:style>
+          <a:lnRef idx="1">
+            <a:schemeClr val="accent1"/>
+          </a:lnRef>
+          <a:fillRef idx="0">
+            <a:schemeClr val="accent1"/>
+          </a:fillRef>
+          <a:effectRef idx="0">
+            <a:schemeClr val="accent1"/>
+          </a:effectRef>
+          <a:fontRef idx="minor">
+            <a:schemeClr val="tx1"/>
+          </a:fontRef>
+        </p:style>
+      </p:cxnSp>
+      <p:sp>
+        <p:nvSpPr>
+          <p:cNvPr id="469" name="TextBox 468">
+            <a:extLst>
+              <a:ext uri="{FF2B5EF4-FFF2-40B4-BE49-F238E27FC236}">
+                <a16:creationId xmlns:a16="http://schemas.microsoft.com/office/drawing/2014/main" id="{9A9B1ECA-D9FB-694C-BFCB-4C2C89AFC91A}"/>
+              </a:ext>
+            </a:extLst>
+          </p:cNvPr>
+          <p:cNvSpPr txBox="1"/>
+          <p:nvPr/>
+        </p:nvSpPr>
+        <p:spPr>
+          <a:xfrm>
+            <a:off x="13533828" y="12429751"/>
+            <a:ext cx="1133673" cy="344069"/>
+          </a:xfrm>
+          <a:prstGeom prst="rect">
+            <a:avLst/>
+          </a:prstGeom>
+          <a:noFill/>
+        </p:spPr>
+        <p:txBody>
+          <a:bodyPr wrap="square" rtlCol="0">
+            <a:spAutoFit/>
+          </a:bodyPr>
+          <a:lstStyle/>
+          <a:p>
+            <a:pPr algn="ctr"/>
+            <a:r>
+              <a:rPr lang="en-US" sz="818" dirty="0">
+                <a:latin typeface="Century Gothic" charset="0"/>
+                <a:ea typeface="Century Gothic" charset="0"/>
+                <a:cs typeface="Century Gothic" charset="0"/>
+              </a:rPr>
+              <a:t>FCV </a:t>
+            </a:r>
+            <a:r>
+              <a:rPr lang="mr-IN" sz="818" dirty="0">
+                <a:latin typeface="Century Gothic" charset="0"/>
+                <a:ea typeface="Century Gothic" charset="0"/>
+                <a:cs typeface="Century Gothic" charset="0"/>
+              </a:rPr>
+              <a:t>–</a:t>
+            </a:r>
+            <a:r>
+              <a:rPr lang="en-US" sz="818" dirty="0">
+                <a:latin typeface="Century Gothic" charset="0"/>
+                <a:ea typeface="Century Gothic" charset="0"/>
+                <a:cs typeface="Century Gothic" charset="0"/>
+              </a:rPr>
+              <a:t> capacity building</a:t>
+            </a:r>
+          </a:p>
+        </p:txBody>
+      </p:sp>
+      <p:sp>
+        <p:nvSpPr>
+          <p:cNvPr id="478" name="Hexagon 477">
+            <a:extLst>
+              <a:ext uri="{FF2B5EF4-FFF2-40B4-BE49-F238E27FC236}">
+                <a16:creationId xmlns:a16="http://schemas.microsoft.com/office/drawing/2014/main" id="{9EA648C9-7977-2E49-A266-CEA5EDE6FECF}"/>
+              </a:ext>
+            </a:extLst>
+          </p:cNvPr>
+          <p:cNvSpPr>
+            <a:spLocks noChangeAspect="1"/>
+          </p:cNvSpPr>
+          <p:nvPr/>
+        </p:nvSpPr>
+        <p:spPr>
+          <a:xfrm>
+            <a:off x="7448679" y="6787325"/>
+            <a:ext cx="1347614" cy="1150538"/>
+          </a:xfrm>
+          <a:prstGeom prst="hexagon">
+            <a:avLst/>
+          </a:prstGeom>
+          <a:solidFill>
+            <a:schemeClr val="accent3">
+              <a:lumMod val="60000"/>
+              <a:lumOff val="40000"/>
+            </a:schemeClr>
+          </a:solidFill>
+          <a:ln w="38100">
+            <a:solidFill>
+              <a:schemeClr val="accent3"/>
+            </a:solidFill>
+          </a:ln>
+        </p:spPr>
+        <p:style>
+          <a:lnRef idx="2">
+            <a:schemeClr val="accent1">
+              <a:shade val="50000"/>
+            </a:schemeClr>
+          </a:lnRef>
+          <a:fillRef idx="1">
+            <a:schemeClr val="accent1"/>
+          </a:fillRef>
+          <a:effectRef idx="0">
+            <a:schemeClr val="accent1"/>
+          </a:effectRef>
+          <a:fontRef idx="minor">
+            <a:schemeClr val="lt1"/>
+          </a:fontRef>
+        </p:style>
+        <p:txBody>
+          <a:bodyPr rtlCol="0" anchor="ctr"/>
+          <a:lstStyle/>
+          <a:p>
+            <a:pPr algn="ctr"/>
+            <a:endParaRPr lang="en-US" sz="2454"/>
+          </a:p>
+        </p:txBody>
+      </p:sp>
+      <p:sp>
+        <p:nvSpPr>
+          <p:cNvPr id="508" name="TextBox 507">
+            <a:extLst>
+              <a:ext uri="{FF2B5EF4-FFF2-40B4-BE49-F238E27FC236}">
+                <a16:creationId xmlns:a16="http://schemas.microsoft.com/office/drawing/2014/main" id="{A6326008-04F5-C34A-AED5-F007B11C2524}"/>
+              </a:ext>
+            </a:extLst>
+          </p:cNvPr>
+          <p:cNvSpPr txBox="1"/>
+          <p:nvPr/>
+        </p:nvSpPr>
+        <p:spPr>
+          <a:xfrm>
+            <a:off x="7482411" y="6998968"/>
+            <a:ext cx="1142303" cy="260199"/>
+          </a:xfrm>
+          <a:prstGeom prst="rect">
+            <a:avLst/>
+          </a:prstGeom>
+          <a:noFill/>
+        </p:spPr>
+        <p:txBody>
+          <a:bodyPr wrap="square" rtlCol="0">
+            <a:spAutoFit/>
+          </a:bodyPr>
+          <a:lstStyle/>
+          <a:p>
+            <a:pPr algn="ctr"/>
+            <a:r>
+              <a:rPr lang="en-US" sz="1091" dirty="0">
+                <a:latin typeface="Century Gothic" charset="0"/>
+                <a:ea typeface="Century Gothic" charset="0"/>
+                <a:cs typeface="Century Gothic" charset="0"/>
+              </a:rPr>
+              <a:t>GEMS</a:t>
+            </a:r>
+          </a:p>
+        </p:txBody>
+      </p:sp>
+      <p:cxnSp>
+        <p:nvCxnSpPr>
+          <p:cNvPr id="513" name="Straight Connector 512">
+            <a:extLst>
+              <a:ext uri="{FF2B5EF4-FFF2-40B4-BE49-F238E27FC236}">
+                <a16:creationId xmlns:a16="http://schemas.microsoft.com/office/drawing/2014/main" id="{B209BC14-2281-D640-9457-3275DA34855D}"/>
+              </a:ext>
+            </a:extLst>
+          </p:cNvPr>
+          <p:cNvCxnSpPr/>
+          <p:nvPr/>
+        </p:nvCxnSpPr>
+        <p:spPr>
+          <a:xfrm>
+            <a:off x="7741540" y="7293610"/>
+            <a:ext cx="758417" cy="0"/>
+          </a:xfrm>
+          <a:prstGeom prst="line">
+            <a:avLst/>
+          </a:prstGeom>
+        </p:spPr>
+        <p:style>
+          <a:lnRef idx="1">
+            <a:schemeClr val="accent1"/>
+          </a:lnRef>
+          <a:fillRef idx="0">
+            <a:schemeClr val="accent1"/>
+          </a:fillRef>
+          <a:effectRef idx="0">
+            <a:schemeClr val="accent1"/>
+          </a:effectRef>
+          <a:fontRef idx="minor">
+            <a:schemeClr val="tx1"/>
+          </a:fontRef>
+        </p:style>
+      </p:cxnSp>
+      <p:sp>
+        <p:nvSpPr>
+          <p:cNvPr id="515" name="TextBox 514">
+            <a:extLst>
+              <a:ext uri="{FF2B5EF4-FFF2-40B4-BE49-F238E27FC236}">
+                <a16:creationId xmlns:a16="http://schemas.microsoft.com/office/drawing/2014/main" id="{D1BE8148-DC57-BD44-B792-D0D12822DA33}"/>
+              </a:ext>
+            </a:extLst>
+          </p:cNvPr>
+          <p:cNvSpPr txBox="1"/>
+          <p:nvPr/>
+        </p:nvSpPr>
+        <p:spPr>
+          <a:xfrm>
+            <a:off x="7575315" y="7351563"/>
+            <a:ext cx="1133673" cy="469937"/>
+          </a:xfrm>
+          <a:prstGeom prst="rect">
+            <a:avLst/>
+          </a:prstGeom>
+          <a:noFill/>
+        </p:spPr>
+        <p:txBody>
+          <a:bodyPr wrap="square" rtlCol="0">
+            <a:spAutoFit/>
+          </a:bodyPr>
+          <a:lstStyle/>
+          <a:p>
+            <a:pPr algn="ctr"/>
+            <a:r>
+              <a:rPr lang="en-US" sz="818" dirty="0">
+                <a:latin typeface="Century Gothic" charset="0"/>
+                <a:ea typeface="Century Gothic" charset="0"/>
+                <a:cs typeface="Century Gothic" charset="0"/>
+              </a:rPr>
+              <a:t>FCV </a:t>
+            </a:r>
+            <a:r>
+              <a:rPr lang="mr-IN" sz="818" dirty="0">
+                <a:latin typeface="Century Gothic" charset="0"/>
+                <a:ea typeface="Century Gothic" charset="0"/>
+                <a:cs typeface="Century Gothic" charset="0"/>
+              </a:rPr>
+              <a:t>–</a:t>
+            </a:r>
+            <a:r>
+              <a:rPr lang="en-US" sz="818" dirty="0">
+                <a:latin typeface="Century Gothic" charset="0"/>
+                <a:ea typeface="Century Gothic" charset="0"/>
+                <a:cs typeface="Century Gothic" charset="0"/>
+              </a:rPr>
+              <a:t> geospatial data collection training</a:t>
+            </a:r>
+          </a:p>
+        </p:txBody>
+      </p:sp>
     </p:spTree>
     <p:extLst>
       <p:ext uri="{BB962C8B-B14F-4D97-AF65-F5344CB8AC3E}">
@@ -32371,7 +32544,7 @@
           </p:cNvPicPr>
           <p:nvPr/>
         </p:nvPicPr>
-        <p:blipFill>
+        <p:blipFill rotWithShape="1">
           <a:blip r:embed="rId7">
             <a:extLst>
               <a:ext uri="{28A0092B-C50C-407E-A947-70E740481C1C}">
@@ -32379,15 +32552,13 @@
               </a:ext>
             </a:extLst>
           </a:blip>
-          <a:srcRect/>
-          <a:stretch>
-            <a:fillRect/>
-          </a:stretch>
+          <a:srcRect l="42884" t="63315" r="31578" b="12466"/>
+          <a:stretch/>
         </p:blipFill>
         <p:spPr bwMode="auto">
-          <a:xfrm>
-            <a:off x="7007888" y="1431588"/>
-            <a:ext cx="4354717" cy="4354717"/>
+          <a:xfrm rot="5951766">
+            <a:off x="7740450" y="1981357"/>
+            <a:ext cx="1112015" cy="1054702"/>
           </a:xfrm>
           <a:prstGeom prst="rect">
             <a:avLst/>
@@ -32611,7 +32782,7 @@
         </p:blipFill>
         <p:spPr>
           <a:xfrm>
-            <a:off x="4373646" y="8627478"/>
+            <a:off x="8335980" y="8386846"/>
             <a:ext cx="2724986" cy="2724986"/>
           </a:xfrm>
           <a:prstGeom prst="rect">
@@ -32849,10 +33020,10 @@
       </p:grpSpPr>
       <p:pic>
         <p:nvPicPr>
-          <p:cNvPr id="2" name="Picture 1">
+          <p:cNvPr id="4" name="Picture 3">
             <a:extLst>
               <a:ext uri="{FF2B5EF4-FFF2-40B4-BE49-F238E27FC236}">
-                <a16:creationId xmlns:a16="http://schemas.microsoft.com/office/drawing/2014/main" id="{B22B227D-55E0-2E4E-A553-F61A2B2DDAF8}"/>
+                <a16:creationId xmlns:a16="http://schemas.microsoft.com/office/drawing/2014/main" id="{0277C3E9-ADDE-C748-887F-3D89F37AC12A}"/>
               </a:ext>
             </a:extLst>
           </p:cNvPr>
@@ -32869,13 +33040,13 @@
               </a:ext>
             </a:extLst>
           </a:blip>
-          <a:srcRect l="957"/>
+          <a:srcRect t="5662"/>
           <a:stretch/>
         </p:blipFill>
         <p:spPr>
           <a:xfrm>
-            <a:off x="9697453" y="4953000"/>
-            <a:ext cx="5031372" cy="3810000"/>
+            <a:off x="3425825" y="3248526"/>
+            <a:ext cx="17526000" cy="7679824"/>
           </a:xfrm>
           <a:prstGeom prst="rect">
             <a:avLst/>

</xml_diff>

<commit_message>
Map and GEMS file update
</commit_message>
<xml_diff>
--- a/assets/img/team/Who-Does-What_Sept EAP [Autosaved].pptx
+++ b/assets/img/team/Who-Does-What_Sept EAP [Autosaved].pptx
@@ -5,14 +5,10 @@
     <p:sldMasterId id="2147483675" r:id="rId1"/>
   </p:sldMasterIdLst>
   <p:notesMasterIdLst>
-    <p:notesMasterId r:id="rId7"/>
+    <p:notesMasterId r:id="rId3"/>
   </p:notesMasterIdLst>
   <p:sldIdLst>
     <p:sldId id="257" r:id="rId2"/>
-    <p:sldId id="258" r:id="rId3"/>
-    <p:sldId id="259" r:id="rId4"/>
-    <p:sldId id="260" r:id="rId5"/>
-    <p:sldId id="261" r:id="rId6"/>
   </p:sldIdLst>
   <p:sldSz cx="24377650" cy="13716000"/>
   <p:notesSz cx="6858000" cy="9144000"/>
@@ -247,7 +243,7 @@
             <a:fld id="{3CB3D48B-767D-40D5-B840-5027EB30A9C2}" type="datetimeFigureOut">
               <a:rPr lang="en-US" smtClean="0"/>
               <a:pPr/>
-              <a:t>10/26/20</a:t>
+              <a:t>12/17/20</a:t>
             </a:fld>
             <a:endParaRPr lang="en-US"/>
           </a:p>
@@ -5353,7 +5349,7 @@
           <a:p>
             <a:fld id="{756377DB-6421-466D-A038-B156AE725FFA}" type="datetime4">
               <a:rPr lang="en-US" smtClean="0"/>
-              <a:t>October 26, 2020</a:t>
+              <a:t>December 17, 2020</a:t>
             </a:fld>
             <a:endParaRPr lang="en-US"/>
           </a:p>
@@ -6439,7 +6435,7 @@
           <a:p>
             <a:fld id="{DAC663EF-3062-4105-BF18-A098977330DD}" type="datetime4">
               <a:rPr lang="en-US" smtClean="0"/>
-              <a:t>October 26, 2020</a:t>
+              <a:t>December 17, 2020</a:t>
             </a:fld>
             <a:endParaRPr lang="en-US"/>
           </a:p>
@@ -7227,7 +7223,7 @@
           <a:p>
             <a:fld id="{B8391083-D2DD-4D07-89E3-0A25A858EE26}" type="datetime4">
               <a:rPr lang="en-US" smtClean="0"/>
-              <a:t>October 26, 2020</a:t>
+              <a:t>December 17, 2020</a:t>
             </a:fld>
             <a:endParaRPr lang="en-US"/>
           </a:p>
@@ -9446,7 +9442,7 @@
           <a:p>
             <a:fld id="{9A83FFFF-B3AE-4C00-8DE6-FCD71DDF6556}" type="datetime4">
               <a:rPr lang="en-US" smtClean="0"/>
-              <a:t>October 26, 2020</a:t>
+              <a:t>December 17, 2020</a:t>
             </a:fld>
             <a:endParaRPr lang="en-US"/>
           </a:p>
@@ -14112,7 +14108,7 @@
           <a:p>
             <a:fld id="{FD7709B8-7745-5F4E-8021-EFB3095139C1}" type="datetimeFigureOut">
               <a:rPr lang="en-US" smtClean="0"/>
-              <a:t>10/26/20</a:t>
+              <a:t>12/17/20</a:t>
             </a:fld>
             <a:endParaRPr lang="en-US"/>
           </a:p>
@@ -30605,42 +30601,6 @@
           </a:p>
         </p:txBody>
       </p:sp>
-      <p:pic>
-        <p:nvPicPr>
-          <p:cNvPr id="7" name="Picture 6">
-            <a:extLst>
-              <a:ext uri="{FF2B5EF4-FFF2-40B4-BE49-F238E27FC236}">
-                <a16:creationId xmlns:a16="http://schemas.microsoft.com/office/drawing/2014/main" id="{1B79EC85-A65E-9E4B-8E63-49FE1E92B6B7}"/>
-              </a:ext>
-            </a:extLst>
-          </p:cNvPr>
-          <p:cNvPicPr>
-            <a:picLocks noChangeAspect="1"/>
-          </p:cNvPicPr>
-          <p:nvPr/>
-        </p:nvPicPr>
-        <p:blipFill>
-          <a:blip r:embed="rId3">
-            <a:extLst>
-              <a:ext uri="{28A0092B-C50C-407E-A947-70E740481C1C}">
-                <a14:useLocalDpi xmlns:a14="http://schemas.microsoft.com/office/drawing/2010/main" val="0"/>
-              </a:ext>
-            </a:extLst>
-          </a:blip>
-          <a:stretch>
-            <a:fillRect/>
-          </a:stretch>
-        </p:blipFill>
-        <p:spPr>
-          <a:xfrm>
-            <a:off x="8181431" y="10696300"/>
-            <a:ext cx="2486568" cy="2486568"/>
-          </a:xfrm>
-          <a:prstGeom prst="rect">
-            <a:avLst/>
-          </a:prstGeom>
-        </p:spPr>
-      </p:pic>
       <p:sp>
         <p:nvSpPr>
           <p:cNvPr id="506" name="Hexagon 505">
@@ -32215,848 +32175,46 @@
           </a:p>
         </p:txBody>
       </p:sp>
+      <p:pic>
+        <p:nvPicPr>
+          <p:cNvPr id="377" name="officeArt object">
+            <a:extLst>
+              <a:ext uri="{FF2B5EF4-FFF2-40B4-BE49-F238E27FC236}">
+                <a16:creationId xmlns:a16="http://schemas.microsoft.com/office/drawing/2014/main" id="{2D9E61BA-3546-6B49-9E3E-F0C86B1CAE8E}"/>
+              </a:ext>
+            </a:extLst>
+          </p:cNvPr>
+          <p:cNvPicPr/>
+          <p:nvPr/>
+        </p:nvPicPr>
+        <p:blipFill>
+          <a:blip r:embed="rId3">
+            <a:extLst/>
+          </a:blip>
+          <a:srcRect b="5030"/>
+          <a:stretch>
+            <a:fillRect/>
+          </a:stretch>
+        </p:blipFill>
+        <p:spPr>
+          <a:xfrm>
+            <a:off x="7767312" y="11402020"/>
+            <a:ext cx="4427905" cy="1935230"/>
+          </a:xfrm>
+          <a:prstGeom prst="rect">
+            <a:avLst/>
+          </a:prstGeom>
+          <a:ln w="12700" cap="flat">
+            <a:noFill/>
+            <a:miter lim="400000"/>
+          </a:ln>
+          <a:effectLst/>
+        </p:spPr>
+      </p:pic>
     </p:spTree>
     <p:extLst>
       <p:ext uri="{BB962C8B-B14F-4D97-AF65-F5344CB8AC3E}">
         <p14:creationId xmlns:p14="http://schemas.microsoft.com/office/powerpoint/2010/main" val="2957757390"/>
-      </p:ext>
-    </p:extLst>
-  </p:cSld>
-  <p:clrMapOvr>
-    <a:masterClrMapping/>
-  </p:clrMapOvr>
-</p:sld>
-</file>
-
-<file path=ppt/slides/slide2.xml><?xml version="1.0" encoding="utf-8"?>
-<p:sld xmlns:a="http://schemas.openxmlformats.org/drawingml/2006/main" xmlns:r="http://schemas.openxmlformats.org/officeDocument/2006/relationships" xmlns:p="http://schemas.openxmlformats.org/presentationml/2006/main">
-  <p:cSld>
-    <p:spTree>
-      <p:nvGrpSpPr>
-        <p:cNvPr id="1" name=""/>
-        <p:cNvGrpSpPr/>
-        <p:nvPr/>
-      </p:nvGrpSpPr>
-      <p:grpSpPr>
-        <a:xfrm>
-          <a:off x="0" y="0"/>
-          <a:ext cx="0" cy="0"/>
-          <a:chOff x="0" y="0"/>
-          <a:chExt cx="0" cy="0"/>
-        </a:xfrm>
-      </p:grpSpPr>
-      <p:pic>
-        <p:nvPicPr>
-          <p:cNvPr id="3" name="Picture 2">
-            <a:extLst>
-              <a:ext uri="{FF2B5EF4-FFF2-40B4-BE49-F238E27FC236}">
-                <a16:creationId xmlns:a16="http://schemas.microsoft.com/office/drawing/2014/main" id="{02E3EF79-D40D-0841-91D9-47FDBAFB3328}"/>
-              </a:ext>
-            </a:extLst>
-          </p:cNvPr>
-          <p:cNvPicPr>
-            <a:picLocks noChangeAspect="1"/>
-          </p:cNvPicPr>
-          <p:nvPr/>
-        </p:nvPicPr>
-        <p:blipFill>
-          <a:blip r:embed="rId2">
-            <a:extLst>
-              <a:ext uri="{28A0092B-C50C-407E-A947-70E740481C1C}">
-                <a14:useLocalDpi xmlns:a14="http://schemas.microsoft.com/office/drawing/2010/main" val="0"/>
-              </a:ext>
-            </a:extLst>
-          </a:blip>
-          <a:stretch>
-            <a:fillRect/>
-          </a:stretch>
-        </p:blipFill>
-        <p:spPr>
-          <a:xfrm>
-            <a:off x="9272170" y="3790616"/>
-            <a:ext cx="4533900" cy="4546600"/>
-          </a:xfrm>
-          <a:prstGeom prst="rect">
-            <a:avLst/>
-          </a:prstGeom>
-        </p:spPr>
-      </p:pic>
-      <p:pic>
-        <p:nvPicPr>
-          <p:cNvPr id="5" name="Picture 4">
-            <a:extLst>
-              <a:ext uri="{FF2B5EF4-FFF2-40B4-BE49-F238E27FC236}">
-                <a16:creationId xmlns:a16="http://schemas.microsoft.com/office/drawing/2014/main" id="{CCAC841A-C575-5140-9EF9-23FAA1B066EE}"/>
-              </a:ext>
-            </a:extLst>
-          </p:cNvPr>
-          <p:cNvPicPr>
-            <a:picLocks noChangeAspect="1"/>
-          </p:cNvPicPr>
-          <p:nvPr/>
-        </p:nvPicPr>
-        <p:blipFill>
-          <a:blip r:embed="rId3">
-            <a:extLst>
-              <a:ext uri="{28A0092B-C50C-407E-A947-70E740481C1C}">
-                <a14:useLocalDpi xmlns:a14="http://schemas.microsoft.com/office/drawing/2010/main" val="0"/>
-              </a:ext>
-            </a:extLst>
-          </a:blip>
-          <a:stretch>
-            <a:fillRect/>
-          </a:stretch>
-        </p:blipFill>
-        <p:spPr>
-          <a:xfrm>
-            <a:off x="14264440" y="7189871"/>
-            <a:ext cx="4533900" cy="4533900"/>
-          </a:xfrm>
-          <a:prstGeom prst="rect">
-            <a:avLst/>
-          </a:prstGeom>
-        </p:spPr>
-      </p:pic>
-      <p:pic>
-        <p:nvPicPr>
-          <p:cNvPr id="7" name="Picture 6">
-            <a:extLst>
-              <a:ext uri="{FF2B5EF4-FFF2-40B4-BE49-F238E27FC236}">
-                <a16:creationId xmlns:a16="http://schemas.microsoft.com/office/drawing/2014/main" id="{8FEBC5AF-4B50-5345-A234-4ADD903387CA}"/>
-              </a:ext>
-            </a:extLst>
-          </p:cNvPr>
-          <p:cNvPicPr>
-            <a:picLocks noChangeAspect="1"/>
-          </p:cNvPicPr>
-          <p:nvPr/>
-        </p:nvPicPr>
-        <p:blipFill>
-          <a:blip r:embed="rId4">
-            <a:extLst>
-              <a:ext uri="{28A0092B-C50C-407E-A947-70E740481C1C}">
-                <a14:useLocalDpi xmlns:a14="http://schemas.microsoft.com/office/drawing/2010/main" val="0"/>
-              </a:ext>
-            </a:extLst>
-          </a:blip>
-          <a:stretch>
-            <a:fillRect/>
-          </a:stretch>
-        </p:blipFill>
-        <p:spPr>
-          <a:xfrm>
-            <a:off x="4977731" y="7238276"/>
-            <a:ext cx="4159974" cy="4159974"/>
-          </a:xfrm>
-          <a:prstGeom prst="rect">
-            <a:avLst/>
-          </a:prstGeom>
-        </p:spPr>
-      </p:pic>
-      <p:pic>
-        <p:nvPicPr>
-          <p:cNvPr id="9" name="Picture 8">
-            <a:extLst>
-              <a:ext uri="{FF2B5EF4-FFF2-40B4-BE49-F238E27FC236}">
-                <a16:creationId xmlns:a16="http://schemas.microsoft.com/office/drawing/2014/main" id="{7E0132A3-1121-0044-9CAC-06557766B482}"/>
-              </a:ext>
-            </a:extLst>
-          </p:cNvPr>
-          <p:cNvPicPr>
-            <a:picLocks noChangeAspect="1"/>
-          </p:cNvPicPr>
-          <p:nvPr/>
-        </p:nvPicPr>
-        <p:blipFill>
-          <a:blip r:embed="rId5">
-            <a:extLst>
-              <a:ext uri="{28A0092B-C50C-407E-A947-70E740481C1C}">
-                <a14:useLocalDpi xmlns:a14="http://schemas.microsoft.com/office/drawing/2010/main" val="0"/>
-              </a:ext>
-            </a:extLst>
-          </a:blip>
-          <a:stretch>
-            <a:fillRect/>
-          </a:stretch>
-        </p:blipFill>
-        <p:spPr>
-          <a:xfrm>
-            <a:off x="15432338" y="981577"/>
-            <a:ext cx="4533900" cy="4533900"/>
-          </a:xfrm>
-          <a:prstGeom prst="rect">
-            <a:avLst/>
-          </a:prstGeom>
-        </p:spPr>
-      </p:pic>
-      <p:pic>
-        <p:nvPicPr>
-          <p:cNvPr id="11" name="Picture 10">
-            <a:extLst>
-              <a:ext uri="{FF2B5EF4-FFF2-40B4-BE49-F238E27FC236}">
-                <a16:creationId xmlns:a16="http://schemas.microsoft.com/office/drawing/2014/main" id="{D6A031EF-25CD-8940-BA49-78001588EC46}"/>
-              </a:ext>
-            </a:extLst>
-          </p:cNvPr>
-          <p:cNvPicPr>
-            <a:picLocks noChangeAspect="1"/>
-          </p:cNvPicPr>
-          <p:nvPr/>
-        </p:nvPicPr>
-        <p:blipFill>
-          <a:blip r:embed="rId6">
-            <a:extLst>
-              <a:ext uri="{28A0092B-C50C-407E-A947-70E740481C1C}">
-                <a14:useLocalDpi xmlns:a14="http://schemas.microsoft.com/office/drawing/2010/main" val="0"/>
-              </a:ext>
-            </a:extLst>
-          </a:blip>
-          <a:stretch>
-            <a:fillRect/>
-          </a:stretch>
-        </p:blipFill>
-        <p:spPr>
-          <a:xfrm>
-            <a:off x="2420519" y="2324100"/>
-            <a:ext cx="4521200" cy="4533900"/>
-          </a:xfrm>
-          <a:prstGeom prst="rect">
-            <a:avLst/>
-          </a:prstGeom>
-        </p:spPr>
-      </p:pic>
-      <p:sp>
-        <p:nvSpPr>
-          <p:cNvPr id="12" name="TextBox 11">
-            <a:extLst>
-              <a:ext uri="{FF2B5EF4-FFF2-40B4-BE49-F238E27FC236}">
-                <a16:creationId xmlns:a16="http://schemas.microsoft.com/office/drawing/2014/main" id="{9597A257-2B0C-B740-A188-F6A1FE4C0F44}"/>
-              </a:ext>
-            </a:extLst>
-          </p:cNvPr>
-          <p:cNvSpPr txBox="1"/>
-          <p:nvPr/>
-        </p:nvSpPr>
-        <p:spPr>
-          <a:xfrm>
-            <a:off x="5633884" y="11723771"/>
-            <a:ext cx="3877747" cy="646203"/>
-          </a:xfrm>
-          <a:prstGeom prst="rect">
-            <a:avLst/>
-          </a:prstGeom>
-          <a:noFill/>
-        </p:spPr>
-        <p:txBody>
-          <a:bodyPr wrap="square" rtlCol="0">
-            <a:spAutoFit/>
-          </a:bodyPr>
-          <a:lstStyle/>
-          <a:p>
-            <a:r>
-              <a:rPr lang="en-US" dirty="0"/>
-              <a:t>#EBEBEB</a:t>
-            </a:r>
-          </a:p>
-        </p:txBody>
-      </p:sp>
-      <p:sp>
-        <p:nvSpPr>
-          <p:cNvPr id="13" name="TextBox 12">
-            <a:extLst>
-              <a:ext uri="{FF2B5EF4-FFF2-40B4-BE49-F238E27FC236}">
-                <a16:creationId xmlns:a16="http://schemas.microsoft.com/office/drawing/2014/main" id="{7A4344E2-1407-C048-A9F9-3ED41F4B4969}"/>
-              </a:ext>
-            </a:extLst>
-          </p:cNvPr>
-          <p:cNvSpPr txBox="1"/>
-          <p:nvPr/>
-        </p:nvSpPr>
-        <p:spPr>
-          <a:xfrm>
-            <a:off x="3063972" y="7189871"/>
-            <a:ext cx="3877747" cy="646203"/>
-          </a:xfrm>
-          <a:prstGeom prst="rect">
-            <a:avLst/>
-          </a:prstGeom>
-          <a:noFill/>
-        </p:spPr>
-        <p:txBody>
-          <a:bodyPr wrap="square" rtlCol="0">
-            <a:spAutoFit/>
-          </a:bodyPr>
-          <a:lstStyle/>
-          <a:p>
-            <a:r>
-              <a:rPr lang="en-US" dirty="0"/>
-              <a:t>#99D8D9</a:t>
-            </a:r>
-          </a:p>
-        </p:txBody>
-      </p:sp>
-      <p:sp>
-        <p:nvSpPr>
-          <p:cNvPr id="14" name="TextBox 13">
-            <a:extLst>
-              <a:ext uri="{FF2B5EF4-FFF2-40B4-BE49-F238E27FC236}">
-                <a16:creationId xmlns:a16="http://schemas.microsoft.com/office/drawing/2014/main" id="{DB4E9990-E5DD-8E40-9642-10C37087E571}"/>
-              </a:ext>
-            </a:extLst>
-          </p:cNvPr>
-          <p:cNvSpPr txBox="1"/>
-          <p:nvPr/>
-        </p:nvSpPr>
-        <p:spPr>
-          <a:xfrm>
-            <a:off x="10386693" y="8793993"/>
-            <a:ext cx="3877747" cy="646203"/>
-          </a:xfrm>
-          <a:prstGeom prst="rect">
-            <a:avLst/>
-          </a:prstGeom>
-          <a:noFill/>
-        </p:spPr>
-        <p:txBody>
-          <a:bodyPr wrap="square" rtlCol="0">
-            <a:spAutoFit/>
-          </a:bodyPr>
-          <a:lstStyle/>
-          <a:p>
-            <a:r>
-              <a:rPr lang="en-US" dirty="0"/>
-              <a:t>#B9D1E2</a:t>
-            </a:r>
-          </a:p>
-        </p:txBody>
-      </p:sp>
-      <p:pic>
-        <p:nvPicPr>
-          <p:cNvPr id="1026" name="Picture 2">
-            <a:extLst>
-              <a:ext uri="{FF2B5EF4-FFF2-40B4-BE49-F238E27FC236}">
-                <a16:creationId xmlns:a16="http://schemas.microsoft.com/office/drawing/2014/main" id="{FD38A3C3-32A1-014D-8463-E638AB57639B}"/>
-              </a:ext>
-            </a:extLst>
-          </p:cNvPr>
-          <p:cNvPicPr>
-            <a:picLocks noChangeAspect="1" noChangeArrowheads="1"/>
-          </p:cNvPicPr>
-          <p:nvPr/>
-        </p:nvPicPr>
-        <p:blipFill rotWithShape="1">
-          <a:blip r:embed="rId7">
-            <a:extLst>
-              <a:ext uri="{28A0092B-C50C-407E-A947-70E740481C1C}">
-                <a14:useLocalDpi xmlns:a14="http://schemas.microsoft.com/office/drawing/2010/main" val="0"/>
-              </a:ext>
-            </a:extLst>
-          </a:blip>
-          <a:srcRect l="42884" t="63315" r="31578" b="12466"/>
-          <a:stretch/>
-        </p:blipFill>
-        <p:spPr bwMode="auto">
-          <a:xfrm rot="5951766">
-            <a:off x="7740450" y="1981357"/>
-            <a:ext cx="1112015" cy="1054702"/>
-          </a:xfrm>
-          <a:prstGeom prst="rect">
-            <a:avLst/>
-          </a:prstGeom>
-          <a:noFill/>
-          <a:extLst>
-            <a:ext uri="{909E8E84-426E-40DD-AFC4-6F175D3DCCD1}">
-              <a14:hiddenFill xmlns:a14="http://schemas.microsoft.com/office/drawing/2010/main">
-                <a:solidFill>
-                  <a:srgbClr val="FFFFFF"/>
-                </a:solidFill>
-              </a14:hiddenFill>
-            </a:ext>
-          </a:extLst>
-        </p:spPr>
-      </p:pic>
-      <p:pic>
-        <p:nvPicPr>
-          <p:cNvPr id="17" name="Picture 16" descr="A picture containing light&#10;&#10;Description automatically generated">
-            <a:extLst>
-              <a:ext uri="{FF2B5EF4-FFF2-40B4-BE49-F238E27FC236}">
-                <a16:creationId xmlns:a16="http://schemas.microsoft.com/office/drawing/2014/main" id="{996B924D-1AF1-1C48-AB38-85A56A819AD8}"/>
-              </a:ext>
-            </a:extLst>
-          </p:cNvPr>
-          <p:cNvPicPr>
-            <a:picLocks noChangeAspect="1"/>
-          </p:cNvPicPr>
-          <p:nvPr/>
-        </p:nvPicPr>
-        <p:blipFill>
-          <a:blip r:embed="rId8">
-            <a:extLst>
-              <a:ext uri="{28A0092B-C50C-407E-A947-70E740481C1C}">
-                <a14:useLocalDpi xmlns:a14="http://schemas.microsoft.com/office/drawing/2010/main" val="0"/>
-              </a:ext>
-            </a:extLst>
-          </a:blip>
-          <a:stretch>
-            <a:fillRect/>
-          </a:stretch>
-        </p:blipFill>
-        <p:spPr>
-          <a:xfrm>
-            <a:off x="15345414" y="981577"/>
-            <a:ext cx="4707747" cy="4707747"/>
-          </a:xfrm>
-          <a:prstGeom prst="rect">
-            <a:avLst/>
-          </a:prstGeom>
-        </p:spPr>
-      </p:pic>
-    </p:spTree>
-    <p:extLst>
-      <p:ext uri="{BB962C8B-B14F-4D97-AF65-F5344CB8AC3E}">
-        <p14:creationId xmlns:p14="http://schemas.microsoft.com/office/powerpoint/2010/main" val="1080712310"/>
-      </p:ext>
-    </p:extLst>
-  </p:cSld>
-  <p:clrMapOvr>
-    <a:masterClrMapping/>
-  </p:clrMapOvr>
-</p:sld>
-</file>
-
-<file path=ppt/slides/slide3.xml><?xml version="1.0" encoding="utf-8"?>
-<p:sld xmlns:a="http://schemas.openxmlformats.org/drawingml/2006/main" xmlns:r="http://schemas.openxmlformats.org/officeDocument/2006/relationships" xmlns:p="http://schemas.openxmlformats.org/presentationml/2006/main">
-  <p:cSld>
-    <p:spTree>
-      <p:nvGrpSpPr>
-        <p:cNvPr id="1" name=""/>
-        <p:cNvGrpSpPr/>
-        <p:nvPr/>
-      </p:nvGrpSpPr>
-      <p:grpSpPr>
-        <a:xfrm>
-          <a:off x="0" y="0"/>
-          <a:ext cx="0" cy="0"/>
-          <a:chOff x="0" y="0"/>
-          <a:chExt cx="0" cy="0"/>
-        </a:xfrm>
-      </p:grpSpPr>
-      <p:pic>
-        <p:nvPicPr>
-          <p:cNvPr id="2" name="Picture 1">
-            <a:extLst>
-              <a:ext uri="{FF2B5EF4-FFF2-40B4-BE49-F238E27FC236}">
-                <a16:creationId xmlns:a16="http://schemas.microsoft.com/office/drawing/2014/main" id="{06B7DA6D-55BE-CE43-941C-27A34742D857}"/>
-              </a:ext>
-            </a:extLst>
-          </p:cNvPr>
-          <p:cNvPicPr>
-            <a:picLocks noChangeAspect="1"/>
-          </p:cNvPicPr>
-          <p:nvPr/>
-        </p:nvPicPr>
-        <p:blipFill>
-          <a:blip r:embed="rId2">
-            <a:extLst>
-              <a:ext uri="{28A0092B-C50C-407E-A947-70E740481C1C}">
-                <a14:useLocalDpi xmlns:a14="http://schemas.microsoft.com/office/drawing/2010/main" val="0"/>
-              </a:ext>
-            </a:extLst>
-          </a:blip>
-          <a:stretch>
-            <a:fillRect/>
-          </a:stretch>
-        </p:blipFill>
-        <p:spPr>
-          <a:xfrm>
-            <a:off x="2502633" y="2276522"/>
-            <a:ext cx="8915251" cy="9109233"/>
-          </a:xfrm>
-          <a:prstGeom prst="rect">
-            <a:avLst/>
-          </a:prstGeom>
-        </p:spPr>
-      </p:pic>
-      <p:pic>
-        <p:nvPicPr>
-          <p:cNvPr id="3" name="Picture 2">
-            <a:extLst>
-              <a:ext uri="{FF2B5EF4-FFF2-40B4-BE49-F238E27FC236}">
-                <a16:creationId xmlns:a16="http://schemas.microsoft.com/office/drawing/2014/main" id="{55123899-962A-1041-890E-5501DD758C96}"/>
-              </a:ext>
-            </a:extLst>
-          </p:cNvPr>
-          <p:cNvPicPr>
-            <a:picLocks noChangeAspect="1" noChangeArrowheads="1"/>
-          </p:cNvPicPr>
-          <p:nvPr/>
-        </p:nvPicPr>
-        <p:blipFill>
-          <a:blip r:embed="rId3">
-            <a:extLst>
-              <a:ext uri="{28A0092B-C50C-407E-A947-70E740481C1C}">
-                <a14:useLocalDpi xmlns:a14="http://schemas.microsoft.com/office/drawing/2010/main" val="0"/>
-              </a:ext>
-            </a:extLst>
-          </a:blip>
-          <a:srcRect/>
-          <a:stretch>
-            <a:fillRect/>
-          </a:stretch>
-        </p:blipFill>
-        <p:spPr bwMode="auto">
-          <a:xfrm>
-            <a:off x="11971603" y="1636597"/>
-            <a:ext cx="10389081" cy="10389081"/>
-          </a:xfrm>
-          <a:prstGeom prst="rect">
-            <a:avLst/>
-          </a:prstGeom>
-          <a:noFill/>
-          <a:extLst>
-            <a:ext uri="{909E8E84-426E-40DD-AFC4-6F175D3DCCD1}">
-              <a14:hiddenFill xmlns:a14="http://schemas.microsoft.com/office/drawing/2010/main">
-                <a:solidFill>
-                  <a:srgbClr val="FFFFFF"/>
-                </a:solidFill>
-              </a14:hiddenFill>
-            </a:ext>
-          </a:extLst>
-        </p:spPr>
-      </p:pic>
-    </p:spTree>
-    <p:extLst>
-      <p:ext uri="{BB962C8B-B14F-4D97-AF65-F5344CB8AC3E}">
-        <p14:creationId xmlns:p14="http://schemas.microsoft.com/office/powerpoint/2010/main" val="3652318058"/>
-      </p:ext>
-    </p:extLst>
-  </p:cSld>
-  <p:clrMapOvr>
-    <a:masterClrMapping/>
-  </p:clrMapOvr>
-</p:sld>
-</file>
-
-<file path=ppt/slides/slide4.xml><?xml version="1.0" encoding="utf-8"?>
-<p:sld xmlns:a="http://schemas.openxmlformats.org/drawingml/2006/main" xmlns:r="http://schemas.openxmlformats.org/officeDocument/2006/relationships" xmlns:p="http://schemas.openxmlformats.org/presentationml/2006/main">
-  <p:cSld>
-    <p:spTree>
-      <p:nvGrpSpPr>
-        <p:cNvPr id="1" name=""/>
-        <p:cNvGrpSpPr/>
-        <p:nvPr/>
-      </p:nvGrpSpPr>
-      <p:grpSpPr>
-        <a:xfrm>
-          <a:off x="0" y="0"/>
-          <a:ext cx="0" cy="0"/>
-          <a:chOff x="0" y="0"/>
-          <a:chExt cx="0" cy="0"/>
-        </a:xfrm>
-      </p:grpSpPr>
-      <p:pic>
-        <p:nvPicPr>
-          <p:cNvPr id="7" name="Picture 6">
-            <a:extLst>
-              <a:ext uri="{FF2B5EF4-FFF2-40B4-BE49-F238E27FC236}">
-                <a16:creationId xmlns:a16="http://schemas.microsoft.com/office/drawing/2014/main" id="{3E09179D-4A62-7441-A7DE-CE5EF78FD4D5}"/>
-              </a:ext>
-            </a:extLst>
-          </p:cNvPr>
-          <p:cNvPicPr>
-            <a:picLocks noChangeAspect="1"/>
-          </p:cNvPicPr>
-          <p:nvPr/>
-        </p:nvPicPr>
-        <p:blipFill>
-          <a:blip r:embed="rId2">
-            <a:extLst>
-              <a:ext uri="{28A0092B-C50C-407E-A947-70E740481C1C}">
-                <a14:useLocalDpi xmlns:a14="http://schemas.microsoft.com/office/drawing/2010/main" val="0"/>
-              </a:ext>
-            </a:extLst>
-          </a:blip>
-          <a:stretch>
-            <a:fillRect/>
-          </a:stretch>
-        </p:blipFill>
-        <p:spPr>
-          <a:xfrm>
-            <a:off x="8335980" y="8386846"/>
-            <a:ext cx="2724986" cy="2724986"/>
-          </a:xfrm>
-          <a:prstGeom prst="rect">
-            <a:avLst/>
-          </a:prstGeom>
-        </p:spPr>
-      </p:pic>
-      <p:pic>
-        <p:nvPicPr>
-          <p:cNvPr id="9" name="Picture 8">
-            <a:extLst>
-              <a:ext uri="{FF2B5EF4-FFF2-40B4-BE49-F238E27FC236}">
-                <a16:creationId xmlns:a16="http://schemas.microsoft.com/office/drawing/2014/main" id="{4377C8BB-34FE-B04B-96DB-3251A0FFADF8}"/>
-              </a:ext>
-            </a:extLst>
-          </p:cNvPr>
-          <p:cNvPicPr>
-            <a:picLocks noChangeAspect="1"/>
-          </p:cNvPicPr>
-          <p:nvPr/>
-        </p:nvPicPr>
-        <p:blipFill>
-          <a:blip r:embed="rId3">
-            <a:extLst>
-              <a:ext uri="{28A0092B-C50C-407E-A947-70E740481C1C}">
-                <a14:useLocalDpi xmlns:a14="http://schemas.microsoft.com/office/drawing/2010/main" val="0"/>
-              </a:ext>
-            </a:extLst>
-          </a:blip>
-          <a:stretch>
-            <a:fillRect/>
-          </a:stretch>
-        </p:blipFill>
-        <p:spPr>
-          <a:xfrm>
-            <a:off x="1607893" y="262509"/>
-            <a:ext cx="3859319" cy="6595491"/>
-          </a:xfrm>
-          <a:prstGeom prst="rect">
-            <a:avLst/>
-          </a:prstGeom>
-        </p:spPr>
-      </p:pic>
-      <p:pic>
-        <p:nvPicPr>
-          <p:cNvPr id="12" name="Picture 11">
-            <a:extLst>
-              <a:ext uri="{FF2B5EF4-FFF2-40B4-BE49-F238E27FC236}">
-                <a16:creationId xmlns:a16="http://schemas.microsoft.com/office/drawing/2014/main" id="{7948E8F3-F626-7A4F-BC69-217F2D33D324}"/>
-              </a:ext>
-            </a:extLst>
-          </p:cNvPr>
-          <p:cNvPicPr>
-            <a:picLocks noChangeAspect="1"/>
-          </p:cNvPicPr>
-          <p:nvPr/>
-        </p:nvPicPr>
-        <p:blipFill>
-          <a:blip r:embed="rId4">
-            <a:alphaModFix amt="5000"/>
-            <a:extLst>
-              <a:ext uri="{28A0092B-C50C-407E-A947-70E740481C1C}">
-                <a14:useLocalDpi xmlns:a14="http://schemas.microsoft.com/office/drawing/2010/main" val="0"/>
-              </a:ext>
-            </a:extLst>
-          </a:blip>
-          <a:stretch>
-            <a:fillRect/>
-          </a:stretch>
-        </p:blipFill>
-        <p:spPr>
-          <a:xfrm>
-            <a:off x="12787339" y="2298443"/>
-            <a:ext cx="7697682" cy="7865172"/>
-          </a:xfrm>
-          <a:prstGeom prst="rect">
-            <a:avLst/>
-          </a:prstGeom>
-        </p:spPr>
-      </p:pic>
-      <p:pic>
-        <p:nvPicPr>
-          <p:cNvPr id="24" name="Picture 23">
-            <a:extLst>
-              <a:ext uri="{FF2B5EF4-FFF2-40B4-BE49-F238E27FC236}">
-                <a16:creationId xmlns:a16="http://schemas.microsoft.com/office/drawing/2014/main" id="{35D04AFC-33FA-AC47-95B3-6ECD61A968BB}"/>
-              </a:ext>
-            </a:extLst>
-          </p:cNvPr>
-          <p:cNvPicPr>
-            <a:picLocks noChangeAspect="1"/>
-          </p:cNvPicPr>
-          <p:nvPr/>
-        </p:nvPicPr>
-        <p:blipFill>
-          <a:blip r:embed="rId5">
-            <a:extLst>
-              <a:ext uri="{BEBA8EAE-BF5A-486C-A8C5-ECC9F3942E4B}">
-                <a14:imgProps xmlns:a14="http://schemas.microsoft.com/office/drawing/2010/main">
-                  <a14:imgLayer r:embed="rId6">
-                    <a14:imgEffect>
-                      <a14:backgroundRemoval t="10000" b="90000" l="10000" r="90000">
-                        <a14:foregroundMark x1="12745" y1="49667" x2="12745" y2="49667"/>
-                        <a14:foregroundMark x1="19284" y1="51885" x2="19284" y2="51885"/>
-                        <a14:foregroundMark x1="36068" y1="36807" x2="36068" y2="36807"/>
-                        <a14:foregroundMark x1="42107" y1="37472" x2="42107" y2="37472"/>
-                        <a14:foregroundMark x1="48230" y1="37472" x2="48230" y2="37472"/>
-                        <a14:foregroundMark x1="53186" y1="39690" x2="53186" y2="39690"/>
-                        <a14:foregroundMark x1="58226" y1="43016" x2="58226" y2="43016"/>
-                        <a14:foregroundMark x1="62974" y1="50333" x2="62974" y2="50333"/>
-                        <a14:foregroundMark x1="69221" y1="55432" x2="69221" y2="55432"/>
-                        <a14:foregroundMark x1="73761" y1="55432" x2="73761" y2="55432"/>
-                        <a14:foregroundMark x1="80008" y1="50333" x2="80008" y2="50333"/>
-                        <a14:foregroundMark x1="84423" y1="48559" x2="84423" y2="48559"/>
-                        <a14:backgroundMark x1="28155" y1="72727" x2="34194" y2="68293"/>
-                        <a14:backgroundMark x1="34194" y1="68293" x2="77051" y2="73836"/>
-                        <a14:backgroundMark x1="77051" y1="73836" x2="82757" y2="71840"/>
-                        <a14:backgroundMark x1="82757" y1="71840" x2="28280" y2="70732"/>
-                        <a14:backgroundMark x1="28280" y1="70732" x2="41441" y2="72062"/>
-                        <a14:backgroundMark x1="41441" y1="72062" x2="34152" y2="72727"/>
-                        <a14:backgroundMark x1="34152" y1="72727" x2="44481" y2="74501"/>
-                        <a14:backgroundMark x1="44481" y1="74501" x2="52312" y2="67627"/>
-                        <a14:backgroundMark x1="52312" y1="67627" x2="46647" y2="74501"/>
-                        <a14:backgroundMark x1="46647" y1="74501" x2="53561" y2="74501"/>
-                        <a14:backgroundMark x1="53561" y1="74501" x2="59184" y2="66519"/>
-                        <a14:backgroundMark x1="59184" y1="66519" x2="65389" y2="71840"/>
-                        <a14:backgroundMark x1="65389" y1="71840" x2="57643" y2="74723"/>
-                        <a14:backgroundMark x1="57643" y1="74723" x2="65764" y2="72727"/>
-                        <a14:backgroundMark x1="65764" y1="72727" x2="72303" y2="73836"/>
-                        <a14:backgroundMark x1="72303" y1="73836" x2="45023" y2="68071"/>
-                        <a14:backgroundMark x1="45023" y1="68071" x2="39067" y2="80488"/>
-                        <a14:backgroundMark x1="39067" y1="80488" x2="38734" y2="79601"/>
-                      </a14:backgroundRemoval>
-                    </a14:imgEffect>
-                  </a14:imgLayer>
-                </a14:imgProps>
-              </a:ext>
-            </a:extLst>
-          </a:blip>
-          <a:stretch>
-            <a:fillRect/>
-          </a:stretch>
-        </p:blipFill>
-        <p:spPr>
-          <a:xfrm>
-            <a:off x="3892629" y="4547699"/>
-            <a:ext cx="8886703" cy="1683330"/>
-          </a:xfrm>
-          <a:prstGeom prst="rect">
-            <a:avLst/>
-          </a:prstGeom>
-          <a:effectLst>
-            <a:outerShdw blurRad="63500" sx="102000" sy="102000" algn="ctr" rotWithShape="0">
-              <a:schemeClr val="tx1">
-                <a:lumMod val="75000"/>
-                <a:alpha val="40000"/>
-              </a:schemeClr>
-            </a:outerShdw>
-          </a:effectLst>
-        </p:spPr>
-      </p:pic>
-      <p:sp>
-        <p:nvSpPr>
-          <p:cNvPr id="8" name="TextBox 7">
-            <a:extLst>
-              <a:ext uri="{FF2B5EF4-FFF2-40B4-BE49-F238E27FC236}">
-                <a16:creationId xmlns:a16="http://schemas.microsoft.com/office/drawing/2014/main" id="{14E3125C-CC4D-724D-BA98-E7871742EBD1}"/>
-              </a:ext>
-            </a:extLst>
-          </p:cNvPr>
-          <p:cNvSpPr txBox="1"/>
-          <p:nvPr/>
-        </p:nvSpPr>
-        <p:spPr>
-          <a:xfrm>
-            <a:off x="13628269" y="5637613"/>
-            <a:ext cx="6015821" cy="1569660"/>
-          </a:xfrm>
-          <a:prstGeom prst="rect">
-            <a:avLst/>
-          </a:prstGeom>
-          <a:noFill/>
-        </p:spPr>
-        <p:txBody>
-          <a:bodyPr wrap="square" rtlCol="0">
-            <a:spAutoFit/>
-          </a:bodyPr>
-          <a:lstStyle/>
-          <a:p>
-            <a:pPr algn="ctr"/>
-            <a:r>
-              <a:rPr lang="en-US" sz="9600" dirty="0">
-                <a:solidFill>
-                  <a:schemeClr val="accent6">
-                    <a:lumMod val="50000"/>
-                  </a:schemeClr>
-                </a:solidFill>
-                <a:latin typeface="Abel" panose="02000506030000020004" pitchFamily="2" charset="0"/>
-                <a:cs typeface="Mishafi Gold" pitchFamily="2" charset="-78"/>
-              </a:rPr>
-              <a:t>ESF</a:t>
-            </a:r>
-          </a:p>
-        </p:txBody>
-      </p:sp>
-    </p:spTree>
-    <p:extLst>
-      <p:ext uri="{BB962C8B-B14F-4D97-AF65-F5344CB8AC3E}">
-        <p14:creationId xmlns:p14="http://schemas.microsoft.com/office/powerpoint/2010/main" val="2785440656"/>
-      </p:ext>
-    </p:extLst>
-  </p:cSld>
-  <p:clrMapOvr>
-    <a:masterClrMapping/>
-  </p:clrMapOvr>
-</p:sld>
-</file>
-
-<file path=ppt/slides/slide5.xml><?xml version="1.0" encoding="utf-8"?>
-<p:sld xmlns:a="http://schemas.openxmlformats.org/drawingml/2006/main" xmlns:r="http://schemas.openxmlformats.org/officeDocument/2006/relationships" xmlns:p="http://schemas.openxmlformats.org/presentationml/2006/main">
-  <p:cSld>
-    <p:spTree>
-      <p:nvGrpSpPr>
-        <p:cNvPr id="1" name=""/>
-        <p:cNvGrpSpPr/>
-        <p:nvPr/>
-      </p:nvGrpSpPr>
-      <p:grpSpPr>
-        <a:xfrm>
-          <a:off x="0" y="0"/>
-          <a:ext cx="0" cy="0"/>
-          <a:chOff x="0" y="0"/>
-          <a:chExt cx="0" cy="0"/>
-        </a:xfrm>
-      </p:grpSpPr>
-      <p:pic>
-        <p:nvPicPr>
-          <p:cNvPr id="4" name="Picture 3">
-            <a:extLst>
-              <a:ext uri="{FF2B5EF4-FFF2-40B4-BE49-F238E27FC236}">
-                <a16:creationId xmlns:a16="http://schemas.microsoft.com/office/drawing/2014/main" id="{0277C3E9-ADDE-C748-887F-3D89F37AC12A}"/>
-              </a:ext>
-            </a:extLst>
-          </p:cNvPr>
-          <p:cNvPicPr>
-            <a:picLocks noChangeAspect="1"/>
-          </p:cNvPicPr>
-          <p:nvPr/>
-        </p:nvPicPr>
-        <p:blipFill rotWithShape="1">
-          <a:blip r:embed="rId2">
-            <a:extLst>
-              <a:ext uri="{28A0092B-C50C-407E-A947-70E740481C1C}">
-                <a14:useLocalDpi xmlns:a14="http://schemas.microsoft.com/office/drawing/2010/main" val="0"/>
-              </a:ext>
-            </a:extLst>
-          </a:blip>
-          <a:srcRect t="5662"/>
-          <a:stretch/>
-        </p:blipFill>
-        <p:spPr>
-          <a:xfrm>
-            <a:off x="3425825" y="3248526"/>
-            <a:ext cx="17526000" cy="7679824"/>
-          </a:xfrm>
-          <a:prstGeom prst="rect">
-            <a:avLst/>
-          </a:prstGeom>
-        </p:spPr>
-      </p:pic>
-    </p:spTree>
-    <p:extLst>
-      <p:ext uri="{BB962C8B-B14F-4D97-AF65-F5344CB8AC3E}">
-        <p14:creationId xmlns:p14="http://schemas.microsoft.com/office/powerpoint/2010/main" val="1476878123"/>
       </p:ext>
     </p:extLst>
   </p:cSld>

</xml_diff>